<commit_message>
ajout d'info par Jade dans ppt
</commit_message>
<xml_diff>
--- a/Presentation.pptx
+++ b/Presentation.pptx
@@ -1159,7 +1159,7 @@
             <a:fld id="{B61BEF0D-F0BB-DE4B-95CE-6DB70DBA9567}" type="datetimeFigureOut">
               <a:rPr lang="en-US" dirty="0"/>
               <a:pPr/>
-              <a:t>2/26/2020</a:t>
+              <a:t>3/3/2020</a:t>
             </a:fld>
             <a:endParaRPr lang="en-US" dirty="0"/>
           </a:p>
@@ -1407,7 +1407,7 @@
             <a:fld id="{B61BEF0D-F0BB-DE4B-95CE-6DB70DBA9567}" type="datetimeFigureOut">
               <a:rPr lang="en-US" dirty="0"/>
               <a:pPr/>
-              <a:t>2/26/2020</a:t>
+              <a:t>3/3/2020</a:t>
             </a:fld>
             <a:endParaRPr lang="en-US" dirty="0"/>
           </a:p>
@@ -1718,7 +1718,7 @@
             <a:fld id="{B61BEF0D-F0BB-DE4B-95CE-6DB70DBA9567}" type="datetimeFigureOut">
               <a:rPr lang="en-US" dirty="0"/>
               <a:pPr/>
-              <a:t>2/26/2020</a:t>
+              <a:t>3/3/2020</a:t>
             </a:fld>
             <a:endParaRPr lang="en-US" dirty="0"/>
           </a:p>
@@ -2056,7 +2056,7 @@
             <a:fld id="{B61BEF0D-F0BB-DE4B-95CE-6DB70DBA9567}" type="datetimeFigureOut">
               <a:rPr lang="en-US" dirty="0"/>
               <a:pPr/>
-              <a:t>2/26/2020</a:t>
+              <a:t>3/3/2020</a:t>
             </a:fld>
             <a:endParaRPr lang="en-US" dirty="0"/>
           </a:p>
@@ -2367,7 +2367,7 @@
             <a:fld id="{B61BEF0D-F0BB-DE4B-95CE-6DB70DBA9567}" type="datetimeFigureOut">
               <a:rPr lang="en-US" dirty="0"/>
               <a:pPr/>
-              <a:t>2/26/2020</a:t>
+              <a:t>3/3/2020</a:t>
             </a:fld>
             <a:endParaRPr lang="en-US" dirty="0"/>
           </a:p>
@@ -2757,7 +2757,7 @@
             <a:fld id="{B61BEF0D-F0BB-DE4B-95CE-6DB70DBA9567}" type="datetimeFigureOut">
               <a:rPr lang="en-US" dirty="0"/>
               <a:pPr/>
-              <a:t>2/26/2020</a:t>
+              <a:t>3/3/2020</a:t>
             </a:fld>
             <a:endParaRPr lang="en-US" dirty="0"/>
           </a:p>
@@ -2923,7 +2923,7 @@
           <a:p>
             <a:fld id="{55C6B4A9-1611-4792-9094-5F34BCA07E0B}" type="datetimeFigureOut">
               <a:rPr lang="en-US" dirty="0"/>
-              <a:t>2/26/2020</a:t>
+              <a:t>3/3/2020</a:t>
             </a:fld>
             <a:endParaRPr lang="en-US" dirty="0"/>
           </a:p>
@@ -3099,7 +3099,7 @@
             <a:fld id="{B61BEF0D-F0BB-DE4B-95CE-6DB70DBA9567}" type="datetimeFigureOut">
               <a:rPr lang="en-US" dirty="0"/>
               <a:pPr/>
-              <a:t>2/26/2020</a:t>
+              <a:t>3/3/2020</a:t>
             </a:fld>
             <a:endParaRPr lang="en-US" dirty="0"/>
           </a:p>
@@ -3272,7 +3272,7 @@
             <a:fld id="{B61BEF0D-F0BB-DE4B-95CE-6DB70DBA9567}" type="datetimeFigureOut">
               <a:rPr lang="en-US" dirty="0"/>
               <a:pPr/>
-              <a:t>2/26/2020</a:t>
+              <a:t>3/3/2020</a:t>
             </a:fld>
             <a:endParaRPr lang="en-US" dirty="0"/>
           </a:p>
@@ -3516,7 +3516,7 @@
             <a:fld id="{B61BEF0D-F0BB-DE4B-95CE-6DB70DBA9567}" type="datetimeFigureOut">
               <a:rPr lang="en-US" dirty="0"/>
               <a:pPr/>
-              <a:t>2/26/2020</a:t>
+              <a:t>3/3/2020</a:t>
             </a:fld>
             <a:endParaRPr lang="en-US" dirty="0"/>
           </a:p>
@@ -3744,7 +3744,7 @@
           <a:p>
             <a:fld id="{EB712588-04B1-427B-82EE-E8DB90309F08}" type="datetimeFigureOut">
               <a:rPr lang="en-US" dirty="0"/>
-              <a:t>2/26/2020</a:t>
+              <a:t>3/3/2020</a:t>
             </a:fld>
             <a:endParaRPr lang="en-US" dirty="0"/>
           </a:p>
@@ -4114,7 +4114,7 @@
             <a:fld id="{B61BEF0D-F0BB-DE4B-95CE-6DB70DBA9567}" type="datetimeFigureOut">
               <a:rPr lang="en-US" dirty="0"/>
               <a:pPr/>
-              <a:t>2/26/2020</a:t>
+              <a:t>3/3/2020</a:t>
             </a:fld>
             <a:endParaRPr lang="en-US" dirty="0"/>
           </a:p>
@@ -4234,7 +4234,7 @@
             <a:fld id="{B61BEF0D-F0BB-DE4B-95CE-6DB70DBA9567}" type="datetimeFigureOut">
               <a:rPr lang="en-US" dirty="0"/>
               <a:pPr/>
-              <a:t>2/26/2020</a:t>
+              <a:t>3/3/2020</a:t>
             </a:fld>
             <a:endParaRPr lang="en-US" dirty="0"/>
           </a:p>
@@ -4326,7 +4326,7 @@
             <a:fld id="{B61BEF0D-F0BB-DE4B-95CE-6DB70DBA9567}" type="datetimeFigureOut">
               <a:rPr lang="en-US" dirty="0"/>
               <a:pPr/>
-              <a:t>2/26/2020</a:t>
+              <a:t>3/3/2020</a:t>
             </a:fld>
             <a:endParaRPr lang="en-US" dirty="0"/>
           </a:p>
@@ -4577,7 +4577,7 @@
           <a:p>
             <a:fld id="{42A54C80-263E-416B-A8E0-580EDEADCBDC}" type="datetimeFigureOut">
               <a:rPr lang="en-US" dirty="0"/>
-              <a:t>2/26/2020</a:t>
+              <a:t>3/3/2020</a:t>
             </a:fld>
             <a:endParaRPr lang="en-US" dirty="0"/>
           </a:p>
@@ -4836,7 +4836,7 @@
             <a:fld id="{B61BEF0D-F0BB-DE4B-95CE-6DB70DBA9567}" type="datetimeFigureOut">
               <a:rPr lang="en-US" dirty="0"/>
               <a:pPr/>
-              <a:t>2/26/2020</a:t>
+              <a:t>3/3/2020</a:t>
             </a:fld>
             <a:endParaRPr lang="en-US" dirty="0"/>
           </a:p>
@@ -5576,7 +5576,7 @@
             <a:fld id="{B61BEF0D-F0BB-DE4B-95CE-6DB70DBA9567}" type="datetimeFigureOut">
               <a:rPr lang="en-US" dirty="0"/>
               <a:pPr/>
-              <a:t>2/26/2020</a:t>
+              <a:t>3/3/2020</a:t>
             </a:fld>
             <a:endParaRPr lang="en-US" dirty="0"/>
           </a:p>
@@ -7109,7 +7109,7 @@
         </p:spPr>
         <p:txBody>
           <a:bodyPr vert="horz" lIns="91440" tIns="45720" rIns="91440" bIns="45720" rtlCol="0" anchor="ctr">
-            <a:normAutofit/>
+            <a:normAutofit fontScale="90000"/>
           </a:bodyPr>
           <a:lstStyle/>
           <a:p>
@@ -7127,7 +7127,23 @@
                   <a:schemeClr val="bg1"/>
                 </a:solidFill>
               </a:rPr>
-              <a:t> de php + base de </a:t>
+              <a:t> de </a:t>
+            </a:r>
+            <a:r>
+              <a:rPr lang="en-US" dirty="0" err="1">
+                <a:solidFill>
+                  <a:schemeClr val="bg1"/>
+                </a:solidFill>
+              </a:rPr>
+              <a:t>nodeJs</a:t>
+            </a:r>
+            <a:r>
+              <a:rPr lang="en-US" dirty="0">
+                <a:solidFill>
+                  <a:schemeClr val="bg1"/>
+                </a:solidFill>
+              </a:rPr>
+              <a:t> &amp; base de </a:t>
             </a:r>
             <a:r>
               <a:rPr lang="en-US" dirty="0" err="1">
@@ -7173,7 +7189,278 @@
           </a:bodyPr>
           <a:lstStyle/>
           <a:p>
-            <a:endParaRPr lang="en-US">
+            <a:r>
+              <a:rPr lang="en-CA" dirty="0">
+                <a:solidFill>
+                  <a:schemeClr val="bg1"/>
+                </a:solidFill>
+              </a:rPr>
+              <a:t>Utilisation de </a:t>
+            </a:r>
+            <a:r>
+              <a:rPr lang="en-CA" dirty="0" err="1">
+                <a:solidFill>
+                  <a:schemeClr val="bg1"/>
+                </a:solidFill>
+              </a:rPr>
+              <a:t>NodeJs</a:t>
+            </a:r>
+            <a:r>
+              <a:rPr lang="en-CA" dirty="0">
+                <a:solidFill>
+                  <a:schemeClr val="bg1"/>
+                </a:solidFill>
+              </a:rPr>
+              <a:t> </a:t>
+            </a:r>
+            <a:r>
+              <a:rPr lang="en-CA" dirty="0" err="1">
+                <a:solidFill>
+                  <a:schemeClr val="bg1"/>
+                </a:solidFill>
+              </a:rPr>
+              <a:t>afin</a:t>
+            </a:r>
+            <a:r>
+              <a:rPr lang="en-CA" dirty="0">
+                <a:solidFill>
+                  <a:schemeClr val="bg1"/>
+                </a:solidFill>
+              </a:rPr>
+              <a:t> de </a:t>
+            </a:r>
+            <a:r>
+              <a:rPr lang="en-CA" dirty="0" err="1">
+                <a:solidFill>
+                  <a:schemeClr val="bg1"/>
+                </a:solidFill>
+              </a:rPr>
+              <a:t>gérer</a:t>
+            </a:r>
+            <a:r>
+              <a:rPr lang="en-CA" dirty="0">
+                <a:solidFill>
+                  <a:schemeClr val="bg1"/>
+                </a:solidFill>
+              </a:rPr>
+              <a:t> le </a:t>
+            </a:r>
+            <a:r>
+              <a:rPr lang="en-CA" dirty="0" err="1">
+                <a:solidFill>
+                  <a:schemeClr val="bg1"/>
+                </a:solidFill>
+              </a:rPr>
+              <a:t>serveur</a:t>
+            </a:r>
+            <a:r>
+              <a:rPr lang="en-CA" dirty="0">
+                <a:solidFill>
+                  <a:schemeClr val="bg1"/>
+                </a:solidFill>
+              </a:rPr>
+              <a:t> </a:t>
+            </a:r>
+            <a:r>
+              <a:rPr lang="en-CA" dirty="0" err="1">
+                <a:solidFill>
+                  <a:schemeClr val="bg1"/>
+                </a:solidFill>
+              </a:rPr>
+              <a:t>en</a:t>
+            </a:r>
+            <a:r>
+              <a:rPr lang="en-CA" dirty="0">
+                <a:solidFill>
+                  <a:schemeClr val="bg1"/>
+                </a:solidFill>
+              </a:rPr>
+              <a:t> </a:t>
+            </a:r>
+            <a:r>
+              <a:rPr lang="en-CA" dirty="0" err="1">
+                <a:solidFill>
+                  <a:schemeClr val="bg1"/>
+                </a:solidFill>
+              </a:rPr>
+              <a:t>backEnd</a:t>
+            </a:r>
+            <a:endParaRPr lang="en-CA" dirty="0">
+              <a:solidFill>
+                <a:schemeClr val="bg1"/>
+              </a:solidFill>
+            </a:endParaRPr>
+          </a:p>
+          <a:p>
+            <a:r>
+              <a:rPr lang="en-CA" dirty="0">
+                <a:solidFill>
+                  <a:schemeClr val="bg1"/>
+                </a:solidFill>
+              </a:rPr>
+              <a:t>Aller </a:t>
+            </a:r>
+            <a:r>
+              <a:rPr lang="en-CA" dirty="0" err="1">
+                <a:solidFill>
+                  <a:schemeClr val="bg1"/>
+                </a:solidFill>
+              </a:rPr>
+              <a:t>chercher</a:t>
+            </a:r>
+            <a:r>
+              <a:rPr lang="en-CA" dirty="0">
+                <a:solidFill>
+                  <a:schemeClr val="bg1"/>
+                </a:solidFill>
+              </a:rPr>
+              <a:t> les </a:t>
+            </a:r>
+            <a:r>
+              <a:rPr lang="en-CA" dirty="0" err="1">
+                <a:solidFill>
+                  <a:schemeClr val="bg1"/>
+                </a:solidFill>
+              </a:rPr>
+              <a:t>données</a:t>
+            </a:r>
+            <a:r>
+              <a:rPr lang="en-CA" dirty="0">
+                <a:solidFill>
+                  <a:schemeClr val="bg1"/>
+                </a:solidFill>
+              </a:rPr>
+              <a:t> </a:t>
+            </a:r>
+            <a:r>
+              <a:rPr lang="en-CA" dirty="0" err="1">
+                <a:solidFill>
+                  <a:schemeClr val="bg1"/>
+                </a:solidFill>
+              </a:rPr>
+              <a:t>insérées</a:t>
+            </a:r>
+            <a:r>
+              <a:rPr lang="en-CA" dirty="0">
+                <a:solidFill>
+                  <a:schemeClr val="bg1"/>
+                </a:solidFill>
+              </a:rPr>
+              <a:t> dans la base de </a:t>
+            </a:r>
+            <a:r>
+              <a:rPr lang="en-CA" dirty="0" err="1">
+                <a:solidFill>
+                  <a:schemeClr val="bg1"/>
+                </a:solidFill>
+              </a:rPr>
+              <a:t>données</a:t>
+            </a:r>
+            <a:r>
+              <a:rPr lang="en-CA" dirty="0">
+                <a:solidFill>
+                  <a:schemeClr val="bg1"/>
+                </a:solidFill>
+              </a:rPr>
+              <a:t> par PHP à </a:t>
+            </a:r>
+            <a:r>
+              <a:rPr lang="en-CA" dirty="0" err="1">
+                <a:solidFill>
+                  <a:schemeClr val="bg1"/>
+                </a:solidFill>
+              </a:rPr>
+              <a:t>l’aide</a:t>
+            </a:r>
+            <a:r>
+              <a:rPr lang="en-CA" dirty="0">
+                <a:solidFill>
+                  <a:schemeClr val="bg1"/>
+                </a:solidFill>
+              </a:rPr>
+              <a:t> des </a:t>
+            </a:r>
+            <a:r>
+              <a:rPr lang="en-CA" dirty="0" err="1">
+                <a:solidFill>
+                  <a:schemeClr val="bg1"/>
+                </a:solidFill>
+              </a:rPr>
+              <a:t>données</a:t>
+            </a:r>
+            <a:r>
+              <a:rPr lang="en-CA" dirty="0">
+                <a:solidFill>
+                  <a:schemeClr val="bg1"/>
+                </a:solidFill>
+              </a:rPr>
+              <a:t> </a:t>
+            </a:r>
+            <a:r>
+              <a:rPr lang="en-CA" dirty="0" err="1">
+                <a:solidFill>
+                  <a:schemeClr val="bg1"/>
+                </a:solidFill>
+              </a:rPr>
+              <a:t>reçus</a:t>
+            </a:r>
+            <a:r>
+              <a:rPr lang="en-CA" dirty="0">
+                <a:solidFill>
+                  <a:schemeClr val="bg1"/>
+                </a:solidFill>
+              </a:rPr>
+              <a:t> des </a:t>
+            </a:r>
+            <a:r>
+              <a:rPr lang="en-CA" dirty="0" err="1">
+                <a:solidFill>
+                  <a:schemeClr val="bg1"/>
+                </a:solidFill>
+              </a:rPr>
+              <a:t>périphériques</a:t>
+            </a:r>
+            <a:r>
+              <a:rPr lang="en-CA" dirty="0">
+                <a:solidFill>
+                  <a:schemeClr val="bg1"/>
+                </a:solidFill>
+              </a:rPr>
+              <a:t> et </a:t>
+            </a:r>
+            <a:r>
+              <a:rPr lang="en-CA" dirty="0" err="1">
+                <a:solidFill>
+                  <a:schemeClr val="bg1"/>
+                </a:solidFill>
+              </a:rPr>
+              <a:t>retransmettre</a:t>
+            </a:r>
+            <a:r>
+              <a:rPr lang="en-CA" dirty="0">
+                <a:solidFill>
+                  <a:schemeClr val="bg1"/>
+                </a:solidFill>
+              </a:rPr>
+              <a:t> le tout au Front End </a:t>
+            </a:r>
+            <a:r>
+              <a:rPr lang="en-CA" dirty="0" err="1">
+                <a:solidFill>
+                  <a:schemeClr val="bg1"/>
+                </a:solidFill>
+              </a:rPr>
+              <a:t>en</a:t>
+            </a:r>
+            <a:r>
+              <a:rPr lang="en-CA" dirty="0">
+                <a:solidFill>
+                  <a:schemeClr val="bg1"/>
+                </a:solidFill>
+              </a:rPr>
+              <a:t> JS</a:t>
+            </a:r>
+            <a:endParaRPr lang="en-US" dirty="0">
               <a:solidFill>
                 <a:schemeClr val="bg1"/>
               </a:solidFill>
@@ -11722,11 +12009,481 @@
         </p:spPr>
         <p:txBody>
           <a:bodyPr vert="horz" lIns="91440" tIns="45720" rIns="91440" bIns="45720" rtlCol="0">
-            <a:normAutofit/>
+            <a:normAutofit fontScale="92500" lnSpcReduction="10000"/>
           </a:bodyPr>
           <a:lstStyle/>
           <a:p>
-            <a:endParaRPr lang="en-US">
+            <a:r>
+              <a:rPr lang="en-CA" dirty="0" err="1">
+                <a:solidFill>
+                  <a:schemeClr val="bg1"/>
+                </a:solidFill>
+              </a:rPr>
+              <a:t>Pouvoir</a:t>
+            </a:r>
+            <a:r>
+              <a:rPr lang="en-CA" dirty="0">
+                <a:solidFill>
+                  <a:schemeClr val="bg1"/>
+                </a:solidFill>
+              </a:rPr>
+              <a:t> lire et </a:t>
+            </a:r>
+            <a:r>
+              <a:rPr lang="en-CA" dirty="0" err="1">
+                <a:solidFill>
+                  <a:schemeClr val="bg1"/>
+                </a:solidFill>
+              </a:rPr>
+              <a:t>afficher</a:t>
+            </a:r>
+            <a:r>
+              <a:rPr lang="en-CA" dirty="0">
+                <a:solidFill>
+                  <a:schemeClr val="bg1"/>
+                </a:solidFill>
+              </a:rPr>
+              <a:t> </a:t>
+            </a:r>
+            <a:r>
+              <a:rPr lang="en-CA" dirty="0" err="1">
+                <a:solidFill>
+                  <a:schemeClr val="bg1"/>
+                </a:solidFill>
+              </a:rPr>
+              <a:t>en</a:t>
+            </a:r>
+            <a:r>
+              <a:rPr lang="en-CA" dirty="0">
+                <a:solidFill>
+                  <a:schemeClr val="bg1"/>
+                </a:solidFill>
+              </a:rPr>
+              <a:t> temps </a:t>
+            </a:r>
+            <a:r>
+              <a:rPr lang="en-CA" dirty="0" err="1">
+                <a:solidFill>
+                  <a:schemeClr val="bg1"/>
+                </a:solidFill>
+              </a:rPr>
+              <a:t>réelle</a:t>
+            </a:r>
+            <a:r>
+              <a:rPr lang="en-CA" dirty="0">
+                <a:solidFill>
+                  <a:schemeClr val="bg1"/>
+                </a:solidFill>
+              </a:rPr>
+              <a:t>, les </a:t>
+            </a:r>
+            <a:r>
+              <a:rPr lang="en-CA" dirty="0" err="1">
+                <a:solidFill>
+                  <a:schemeClr val="bg1"/>
+                </a:solidFill>
+              </a:rPr>
+              <a:t>données</a:t>
+            </a:r>
+            <a:r>
+              <a:rPr lang="en-CA" dirty="0">
+                <a:solidFill>
+                  <a:schemeClr val="bg1"/>
+                </a:solidFill>
+              </a:rPr>
+              <a:t> de </a:t>
+            </a:r>
+            <a:r>
+              <a:rPr lang="en-CA" dirty="0" err="1">
+                <a:solidFill>
+                  <a:schemeClr val="bg1"/>
+                </a:solidFill>
+              </a:rPr>
+              <a:t>l’environnement</a:t>
+            </a:r>
+            <a:r>
+              <a:rPr lang="en-CA" dirty="0">
+                <a:solidFill>
+                  <a:schemeClr val="bg1"/>
+                </a:solidFill>
+              </a:rPr>
+              <a:t> </a:t>
+            </a:r>
+            <a:r>
+              <a:rPr lang="en-CA" dirty="0" err="1">
+                <a:solidFill>
+                  <a:schemeClr val="bg1"/>
+                </a:solidFill>
+              </a:rPr>
+              <a:t>soit</a:t>
+            </a:r>
+            <a:r>
+              <a:rPr lang="en-CA" dirty="0">
+                <a:solidFill>
+                  <a:schemeClr val="bg1"/>
+                </a:solidFill>
+              </a:rPr>
+              <a:t> la </a:t>
+            </a:r>
+            <a:r>
+              <a:rPr lang="en-CA" dirty="0" err="1">
+                <a:solidFill>
+                  <a:schemeClr val="bg1"/>
+                </a:solidFill>
+              </a:rPr>
+              <a:t>température</a:t>
+            </a:r>
+            <a:r>
+              <a:rPr lang="en-CA" dirty="0">
+                <a:solidFill>
+                  <a:schemeClr val="bg1"/>
+                </a:solidFill>
+              </a:rPr>
+              <a:t> et le </a:t>
+            </a:r>
+            <a:r>
+              <a:rPr lang="en-CA" dirty="0" err="1">
+                <a:solidFill>
+                  <a:schemeClr val="bg1"/>
+                </a:solidFill>
+              </a:rPr>
+              <a:t>niveau</a:t>
+            </a:r>
+            <a:r>
+              <a:rPr lang="en-CA" dirty="0">
+                <a:solidFill>
+                  <a:schemeClr val="bg1"/>
+                </a:solidFill>
+              </a:rPr>
+              <a:t> </a:t>
+            </a:r>
+            <a:r>
+              <a:rPr lang="en-CA" dirty="0" err="1">
+                <a:solidFill>
+                  <a:schemeClr val="bg1"/>
+                </a:solidFill>
+              </a:rPr>
+              <a:t>d’humité</a:t>
+            </a:r>
+            <a:endParaRPr lang="en-CA" dirty="0">
+              <a:solidFill>
+                <a:schemeClr val="bg1"/>
+              </a:solidFill>
+            </a:endParaRPr>
+          </a:p>
+          <a:p>
+            <a:r>
+              <a:rPr lang="en-CA" dirty="0" err="1">
+                <a:solidFill>
+                  <a:schemeClr val="bg1"/>
+                </a:solidFill>
+              </a:rPr>
+              <a:t>Pouvoir</a:t>
+            </a:r>
+            <a:r>
+              <a:rPr lang="en-CA" dirty="0">
+                <a:solidFill>
+                  <a:schemeClr val="bg1"/>
+                </a:solidFill>
+              </a:rPr>
+              <a:t> adjuster les deux </a:t>
+            </a:r>
+            <a:r>
+              <a:rPr lang="en-CA" dirty="0" err="1">
+                <a:solidFill>
+                  <a:schemeClr val="bg1"/>
+                </a:solidFill>
+              </a:rPr>
+              <a:t>paramètres</a:t>
+            </a:r>
+            <a:r>
+              <a:rPr lang="en-CA" dirty="0">
+                <a:solidFill>
+                  <a:schemeClr val="bg1"/>
+                </a:solidFill>
+              </a:rPr>
+              <a:t> </a:t>
+            </a:r>
+            <a:r>
+              <a:rPr lang="en-CA" dirty="0" err="1">
+                <a:solidFill>
+                  <a:schemeClr val="bg1"/>
+                </a:solidFill>
+              </a:rPr>
+              <a:t>mentionnées</a:t>
+            </a:r>
+            <a:r>
+              <a:rPr lang="en-CA" dirty="0">
+                <a:solidFill>
+                  <a:schemeClr val="bg1"/>
+                </a:solidFill>
+              </a:rPr>
+              <a:t> ci-</a:t>
+            </a:r>
+            <a:r>
+              <a:rPr lang="en-CA" dirty="0" err="1">
+                <a:solidFill>
+                  <a:schemeClr val="bg1"/>
+                </a:solidFill>
+              </a:rPr>
+              <a:t>haut</a:t>
+            </a:r>
+            <a:r>
+              <a:rPr lang="en-CA" dirty="0">
+                <a:solidFill>
+                  <a:schemeClr val="bg1"/>
+                </a:solidFill>
+              </a:rPr>
+              <a:t> à </a:t>
+            </a:r>
+            <a:r>
+              <a:rPr lang="en-CA" dirty="0" err="1">
+                <a:solidFill>
+                  <a:schemeClr val="bg1"/>
+                </a:solidFill>
+              </a:rPr>
+              <a:t>l’aide</a:t>
+            </a:r>
+            <a:r>
+              <a:rPr lang="en-CA" dirty="0">
+                <a:solidFill>
+                  <a:schemeClr val="bg1"/>
+                </a:solidFill>
+              </a:rPr>
+              <a:t> de </a:t>
+            </a:r>
+            <a:r>
+              <a:rPr lang="en-CA" dirty="0" err="1">
+                <a:solidFill>
+                  <a:schemeClr val="bg1"/>
+                </a:solidFill>
+              </a:rPr>
+              <a:t>périphériques</a:t>
+            </a:r>
+            <a:r>
+              <a:rPr lang="en-CA" dirty="0">
+                <a:solidFill>
+                  <a:schemeClr val="bg1"/>
+                </a:solidFill>
+              </a:rPr>
+              <a:t>, </a:t>
+            </a:r>
+            <a:r>
+              <a:rPr lang="en-CA" dirty="0" err="1">
+                <a:solidFill>
+                  <a:schemeClr val="bg1"/>
+                </a:solidFill>
+              </a:rPr>
+              <a:t>soit</a:t>
+            </a:r>
+            <a:r>
+              <a:rPr lang="en-CA" dirty="0">
+                <a:solidFill>
+                  <a:schemeClr val="bg1"/>
+                </a:solidFill>
+              </a:rPr>
+              <a:t> un </a:t>
+            </a:r>
+            <a:r>
+              <a:rPr lang="en-CA" dirty="0" err="1">
+                <a:solidFill>
+                  <a:schemeClr val="bg1"/>
+                </a:solidFill>
+              </a:rPr>
+              <a:t>ventilateur</a:t>
+            </a:r>
+            <a:r>
+              <a:rPr lang="en-CA" dirty="0">
+                <a:solidFill>
+                  <a:schemeClr val="bg1"/>
+                </a:solidFill>
+              </a:rPr>
+              <a:t> et un </a:t>
+            </a:r>
+            <a:r>
+              <a:rPr lang="en-CA" dirty="0" err="1">
+                <a:solidFill>
+                  <a:schemeClr val="bg1"/>
+                </a:solidFill>
+              </a:rPr>
+              <a:t>brumisateur</a:t>
+            </a:r>
+            <a:r>
+              <a:rPr lang="en-CA" dirty="0">
+                <a:solidFill>
+                  <a:schemeClr val="bg1"/>
+                </a:solidFill>
+              </a:rPr>
+              <a:t> </a:t>
+            </a:r>
+            <a:r>
+              <a:rPr lang="en-CA" dirty="0" err="1">
+                <a:solidFill>
+                  <a:schemeClr val="bg1"/>
+                </a:solidFill>
+              </a:rPr>
+              <a:t>ou</a:t>
+            </a:r>
+            <a:r>
+              <a:rPr lang="en-CA" dirty="0">
+                <a:solidFill>
+                  <a:schemeClr val="bg1"/>
+                </a:solidFill>
+              </a:rPr>
+              <a:t> </a:t>
+            </a:r>
+            <a:r>
+              <a:rPr lang="en-CA" dirty="0" err="1">
+                <a:solidFill>
+                  <a:schemeClr val="bg1"/>
+                </a:solidFill>
+              </a:rPr>
+              <a:t>arroseur</a:t>
+            </a:r>
+            <a:endParaRPr lang="en-CA" dirty="0">
+              <a:solidFill>
+                <a:schemeClr val="bg1"/>
+              </a:solidFill>
+            </a:endParaRPr>
+          </a:p>
+          <a:p>
+            <a:r>
+              <a:rPr lang="en-CA" dirty="0" err="1">
+                <a:solidFill>
+                  <a:schemeClr val="bg1"/>
+                </a:solidFill>
+              </a:rPr>
+              <a:t>Avoir</a:t>
+            </a:r>
+            <a:r>
+              <a:rPr lang="en-CA" dirty="0">
+                <a:solidFill>
+                  <a:schemeClr val="bg1"/>
+                </a:solidFill>
+              </a:rPr>
+              <a:t> un </a:t>
+            </a:r>
+            <a:r>
+              <a:rPr lang="en-CA" dirty="0" err="1">
+                <a:solidFill>
+                  <a:schemeClr val="bg1"/>
+                </a:solidFill>
+              </a:rPr>
+              <a:t>historique</a:t>
+            </a:r>
+            <a:r>
+              <a:rPr lang="en-CA" dirty="0">
+                <a:solidFill>
+                  <a:schemeClr val="bg1"/>
+                </a:solidFill>
+              </a:rPr>
+              <a:t> de </a:t>
+            </a:r>
+            <a:r>
+              <a:rPr lang="en-CA" dirty="0" err="1">
+                <a:solidFill>
+                  <a:schemeClr val="bg1"/>
+                </a:solidFill>
+              </a:rPr>
+              <a:t>données</a:t>
+            </a:r>
+            <a:r>
+              <a:rPr lang="en-CA" dirty="0">
+                <a:solidFill>
+                  <a:schemeClr val="bg1"/>
+                </a:solidFill>
+              </a:rPr>
+              <a:t> </a:t>
+            </a:r>
+            <a:r>
+              <a:rPr lang="en-CA" dirty="0" err="1">
+                <a:solidFill>
+                  <a:schemeClr val="bg1"/>
+                </a:solidFill>
+              </a:rPr>
+              <a:t>afin</a:t>
+            </a:r>
+            <a:r>
+              <a:rPr lang="en-CA" dirty="0">
+                <a:solidFill>
+                  <a:schemeClr val="bg1"/>
+                </a:solidFill>
+              </a:rPr>
+              <a:t> de </a:t>
+            </a:r>
+            <a:r>
+              <a:rPr lang="en-CA" dirty="0" err="1">
+                <a:solidFill>
+                  <a:schemeClr val="bg1"/>
+                </a:solidFill>
+              </a:rPr>
+              <a:t>pouvoir</a:t>
+            </a:r>
+            <a:r>
+              <a:rPr lang="en-CA" dirty="0">
+                <a:solidFill>
+                  <a:schemeClr val="bg1"/>
+                </a:solidFill>
+              </a:rPr>
+              <a:t> adapter les </a:t>
+            </a:r>
+            <a:r>
+              <a:rPr lang="en-CA" dirty="0" err="1">
+                <a:solidFill>
+                  <a:schemeClr val="bg1"/>
+                </a:solidFill>
+              </a:rPr>
+              <a:t>périphériques</a:t>
+            </a:r>
+            <a:r>
+              <a:rPr lang="en-CA" dirty="0">
+                <a:solidFill>
+                  <a:schemeClr val="bg1"/>
+                </a:solidFill>
+              </a:rPr>
+              <a:t> et </a:t>
+            </a:r>
+            <a:r>
+              <a:rPr lang="en-CA" dirty="0" err="1">
+                <a:solidFill>
+                  <a:schemeClr val="bg1"/>
+                </a:solidFill>
+              </a:rPr>
+              <a:t>leur</a:t>
+            </a:r>
+            <a:r>
+              <a:rPr lang="en-CA" dirty="0">
+                <a:solidFill>
+                  <a:schemeClr val="bg1"/>
+                </a:solidFill>
+              </a:rPr>
+              <a:t> </a:t>
+            </a:r>
+            <a:r>
+              <a:rPr lang="en-CA" dirty="0" err="1">
+                <a:solidFill>
+                  <a:schemeClr val="bg1"/>
+                </a:solidFill>
+              </a:rPr>
+              <a:t>fréquence</a:t>
+            </a:r>
+            <a:r>
+              <a:rPr lang="en-CA" dirty="0">
+                <a:solidFill>
+                  <a:schemeClr val="bg1"/>
+                </a:solidFill>
+              </a:rPr>
+              <a:t> de </a:t>
+            </a:r>
+            <a:r>
+              <a:rPr lang="en-CA" dirty="0" err="1">
+                <a:solidFill>
+                  <a:schemeClr val="bg1"/>
+                </a:solidFill>
+              </a:rPr>
+              <a:t>déclenchement</a:t>
+            </a:r>
+            <a:endParaRPr lang="en-US" dirty="0">
               <a:solidFill>
                 <a:schemeClr val="bg1"/>
               </a:solidFill>

</xml_diff>

<commit_message>
projet proposé et résultats attendu
</commit_message>
<xml_diff>
--- a/Presentation.pptx
+++ b/Presentation.pptx
@@ -10895,7 +10895,328 @@
           </a:bodyPr>
           <a:lstStyle/>
           <a:p>
-            <a:endParaRPr lang="en-US">
+            <a:r>
+              <a:rPr lang="en-CA" dirty="0">
+                <a:solidFill>
+                  <a:schemeClr val="bg1"/>
+                </a:solidFill>
+              </a:rPr>
+              <a:t>Stockage des </a:t>
+            </a:r>
+            <a:r>
+              <a:rPr lang="en-CA" dirty="0" err="1">
+                <a:solidFill>
+                  <a:schemeClr val="bg1"/>
+                </a:solidFill>
+              </a:rPr>
+              <a:t>données</a:t>
+            </a:r>
+            <a:r>
+              <a:rPr lang="en-CA" dirty="0">
+                <a:solidFill>
+                  <a:schemeClr val="bg1"/>
+                </a:solidFill>
+              </a:rPr>
+              <a:t> </a:t>
+            </a:r>
+            <a:r>
+              <a:rPr lang="en-CA" dirty="0" err="1">
+                <a:solidFill>
+                  <a:schemeClr val="bg1"/>
+                </a:solidFill>
+              </a:rPr>
+              <a:t>prélevé</a:t>
+            </a:r>
+            <a:r>
+              <a:rPr lang="en-CA" dirty="0">
+                <a:solidFill>
+                  <a:schemeClr val="bg1"/>
+                </a:solidFill>
+              </a:rPr>
+              <a:t> par les </a:t>
+            </a:r>
+            <a:r>
+              <a:rPr lang="en-CA" dirty="0" err="1">
+                <a:solidFill>
+                  <a:schemeClr val="bg1"/>
+                </a:solidFill>
+              </a:rPr>
+              <a:t>périphériques</a:t>
+            </a:r>
+            <a:r>
+              <a:rPr lang="en-CA" dirty="0">
+                <a:solidFill>
+                  <a:schemeClr val="bg1"/>
+                </a:solidFill>
+              </a:rPr>
+              <a:t> </a:t>
+            </a:r>
+            <a:r>
+              <a:rPr lang="en-CA" dirty="0" err="1">
+                <a:solidFill>
+                  <a:schemeClr val="bg1"/>
+                </a:solidFill>
+              </a:rPr>
+              <a:t>vers</a:t>
+            </a:r>
+            <a:r>
+              <a:rPr lang="en-CA" dirty="0">
+                <a:solidFill>
+                  <a:schemeClr val="bg1"/>
+                </a:solidFill>
+              </a:rPr>
+              <a:t> </a:t>
+            </a:r>
+            <a:r>
+              <a:rPr lang="en-CA" dirty="0" err="1">
+                <a:solidFill>
+                  <a:schemeClr val="bg1"/>
+                </a:solidFill>
+              </a:rPr>
+              <a:t>une</a:t>
+            </a:r>
+            <a:r>
+              <a:rPr lang="en-CA" dirty="0">
+                <a:solidFill>
+                  <a:schemeClr val="bg1"/>
+                </a:solidFill>
+              </a:rPr>
+              <a:t> base de </a:t>
+            </a:r>
+            <a:r>
+              <a:rPr lang="en-CA" dirty="0" err="1">
+                <a:solidFill>
+                  <a:schemeClr val="bg1"/>
+                </a:solidFill>
+              </a:rPr>
+              <a:t>données</a:t>
+            </a:r>
+            <a:r>
+              <a:rPr lang="en-CA" dirty="0">
+                <a:solidFill>
+                  <a:schemeClr val="bg1"/>
+                </a:solidFill>
+              </a:rPr>
+              <a:t> sur un </a:t>
+            </a:r>
+            <a:r>
+              <a:rPr lang="en-CA" dirty="0" err="1">
+                <a:solidFill>
+                  <a:schemeClr val="bg1"/>
+                </a:solidFill>
+              </a:rPr>
+              <a:t>serveur</a:t>
+            </a:r>
+            <a:r>
+              <a:rPr lang="en-CA" dirty="0">
+                <a:solidFill>
+                  <a:schemeClr val="bg1"/>
+                </a:solidFill>
+              </a:rPr>
+              <a:t>.</a:t>
+            </a:r>
+          </a:p>
+          <a:p>
+            <a:r>
+              <a:rPr lang="en-CA" dirty="0" err="1">
+                <a:solidFill>
+                  <a:schemeClr val="bg1"/>
+                </a:solidFill>
+              </a:rPr>
+              <a:t>Démarrage</a:t>
+            </a:r>
+            <a:r>
+              <a:rPr lang="en-CA" dirty="0">
+                <a:solidFill>
+                  <a:schemeClr val="bg1"/>
+                </a:solidFill>
+              </a:rPr>
+              <a:t> de la fan </a:t>
+            </a:r>
+            <a:r>
+              <a:rPr lang="en-CA" dirty="0" err="1">
+                <a:solidFill>
+                  <a:schemeClr val="bg1"/>
+                </a:solidFill>
+              </a:rPr>
+              <a:t>lorsqu’il</a:t>
+            </a:r>
+            <a:r>
+              <a:rPr lang="en-CA" dirty="0">
+                <a:solidFill>
+                  <a:schemeClr val="bg1"/>
+                </a:solidFill>
+              </a:rPr>
+              <a:t> fait trop </a:t>
+            </a:r>
+            <a:r>
+              <a:rPr lang="en-CA" dirty="0" err="1">
+                <a:solidFill>
+                  <a:schemeClr val="bg1"/>
+                </a:solidFill>
+              </a:rPr>
+              <a:t>chaud</a:t>
+            </a:r>
+            <a:endParaRPr lang="en-CA" dirty="0">
+              <a:solidFill>
+                <a:schemeClr val="bg1"/>
+              </a:solidFill>
+            </a:endParaRPr>
+          </a:p>
+          <a:p>
+            <a:r>
+              <a:rPr lang="en-CA" dirty="0" err="1">
+                <a:solidFill>
+                  <a:schemeClr val="bg1"/>
+                </a:solidFill>
+              </a:rPr>
+              <a:t>Arrosage</a:t>
+            </a:r>
+            <a:r>
+              <a:rPr lang="en-CA" dirty="0">
+                <a:solidFill>
+                  <a:schemeClr val="bg1"/>
+                </a:solidFill>
+              </a:rPr>
+              <a:t> pour un </a:t>
+            </a:r>
+            <a:r>
+              <a:rPr lang="en-CA" dirty="0" err="1">
+                <a:solidFill>
+                  <a:schemeClr val="bg1"/>
+                </a:solidFill>
+              </a:rPr>
+              <a:t>nombre</a:t>
+            </a:r>
+            <a:r>
+              <a:rPr lang="en-CA" dirty="0">
+                <a:solidFill>
+                  <a:schemeClr val="bg1"/>
+                </a:solidFill>
+              </a:rPr>
+              <a:t> de </a:t>
+            </a:r>
+            <a:r>
+              <a:rPr lang="en-CA" dirty="0" err="1">
+                <a:solidFill>
+                  <a:schemeClr val="bg1"/>
+                </a:solidFill>
+              </a:rPr>
+              <a:t>secondes</a:t>
+            </a:r>
+            <a:r>
+              <a:rPr lang="en-CA" dirty="0">
+                <a:solidFill>
+                  <a:schemeClr val="bg1"/>
+                </a:solidFill>
+              </a:rPr>
+              <a:t>/minutes </a:t>
+            </a:r>
+            <a:r>
+              <a:rPr lang="en-CA" dirty="0" err="1">
+                <a:solidFill>
+                  <a:schemeClr val="bg1"/>
+                </a:solidFill>
+              </a:rPr>
+              <a:t>prédéterminées</a:t>
+            </a:r>
+            <a:r>
+              <a:rPr lang="en-CA" dirty="0">
+                <a:solidFill>
+                  <a:schemeClr val="bg1"/>
+                </a:solidFill>
+              </a:rPr>
+              <a:t> </a:t>
+            </a:r>
+            <a:r>
+              <a:rPr lang="en-CA" dirty="0" err="1">
+                <a:solidFill>
+                  <a:schemeClr val="bg1"/>
+                </a:solidFill>
+              </a:rPr>
+              <a:t>lorsque</a:t>
+            </a:r>
+            <a:r>
+              <a:rPr lang="en-CA" dirty="0">
+                <a:solidFill>
+                  <a:schemeClr val="bg1"/>
+                </a:solidFill>
+              </a:rPr>
+              <a:t> la lecture du </a:t>
+            </a:r>
+            <a:r>
+              <a:rPr lang="en-CA" dirty="0" err="1">
+                <a:solidFill>
+                  <a:schemeClr val="bg1"/>
+                </a:solidFill>
+              </a:rPr>
+              <a:t>taux</a:t>
+            </a:r>
+            <a:r>
+              <a:rPr lang="en-CA" dirty="0">
+                <a:solidFill>
+                  <a:schemeClr val="bg1"/>
+                </a:solidFill>
+              </a:rPr>
+              <a:t> </a:t>
+            </a:r>
+            <a:r>
+              <a:rPr lang="en-CA" dirty="0" err="1">
+                <a:solidFill>
+                  <a:schemeClr val="bg1"/>
+                </a:solidFill>
+              </a:rPr>
+              <a:t>d’humitée</a:t>
+            </a:r>
+            <a:r>
+              <a:rPr lang="en-CA" dirty="0">
+                <a:solidFill>
+                  <a:schemeClr val="bg1"/>
+                </a:solidFill>
+              </a:rPr>
+              <a:t> </a:t>
+            </a:r>
+            <a:r>
+              <a:rPr lang="en-CA" dirty="0" err="1">
+                <a:solidFill>
+                  <a:schemeClr val="bg1"/>
+                </a:solidFill>
+              </a:rPr>
+              <a:t>est</a:t>
+            </a:r>
+            <a:r>
+              <a:rPr lang="en-CA" dirty="0">
+                <a:solidFill>
+                  <a:schemeClr val="bg1"/>
+                </a:solidFill>
+              </a:rPr>
+              <a:t> sous un </a:t>
+            </a:r>
+            <a:r>
+              <a:rPr lang="en-CA" dirty="0" err="1">
+                <a:solidFill>
+                  <a:schemeClr val="bg1"/>
+                </a:solidFill>
+              </a:rPr>
+              <a:t>seuil</a:t>
+            </a:r>
+            <a:r>
+              <a:rPr lang="en-CA" dirty="0">
+                <a:solidFill>
+                  <a:schemeClr val="bg1"/>
+                </a:solidFill>
+              </a:rPr>
+              <a:t> </a:t>
+            </a:r>
+            <a:r>
+              <a:rPr lang="en-CA" dirty="0" err="1">
+                <a:solidFill>
+                  <a:schemeClr val="bg1"/>
+                </a:solidFill>
+              </a:rPr>
+              <a:t>établi</a:t>
+            </a:r>
+            <a:endParaRPr lang="en-US" dirty="0">
               <a:solidFill>
                 <a:schemeClr val="bg1"/>
               </a:solidFill>
@@ -17160,7 +17481,7 @@
           </a:bodyPr>
           <a:lstStyle/>
           <a:p>
-            <a:endParaRPr lang="en-US">
+            <a:endParaRPr lang="en-US" dirty="0">
               <a:solidFill>
                 <a:schemeClr val="bg1"/>
               </a:solidFill>
@@ -19492,7 +19813,111 @@
           </a:bodyPr>
           <a:lstStyle/>
           <a:p>
-            <a:endParaRPr lang="en-US">
+            <a:r>
+              <a:rPr lang="en-CA" dirty="0">
+                <a:solidFill>
+                  <a:schemeClr val="bg1"/>
+                </a:solidFill>
+              </a:rPr>
+              <a:t>Gestion </a:t>
+            </a:r>
+            <a:r>
+              <a:rPr lang="en-CA" dirty="0" err="1">
+                <a:solidFill>
+                  <a:schemeClr val="bg1"/>
+                </a:solidFill>
+              </a:rPr>
+              <a:t>automatisé</a:t>
+            </a:r>
+            <a:r>
+              <a:rPr lang="en-CA" dirty="0">
+                <a:solidFill>
+                  <a:schemeClr val="bg1"/>
+                </a:solidFill>
+              </a:rPr>
+              <a:t> </a:t>
+            </a:r>
+            <a:r>
+              <a:rPr lang="en-CA" dirty="0" err="1">
+                <a:solidFill>
+                  <a:schemeClr val="bg1"/>
+                </a:solidFill>
+              </a:rPr>
+              <a:t>d’environnement</a:t>
+            </a:r>
+            <a:r>
+              <a:rPr lang="en-CA" dirty="0">
+                <a:solidFill>
+                  <a:schemeClr val="bg1"/>
+                </a:solidFill>
+              </a:rPr>
+              <a:t> que </a:t>
+            </a:r>
+            <a:r>
+              <a:rPr lang="en-CA" dirty="0" err="1">
+                <a:solidFill>
+                  <a:schemeClr val="bg1"/>
+                </a:solidFill>
+              </a:rPr>
+              <a:t>ce</a:t>
+            </a:r>
+            <a:r>
+              <a:rPr lang="en-CA" dirty="0">
+                <a:solidFill>
+                  <a:schemeClr val="bg1"/>
+                </a:solidFill>
+              </a:rPr>
+              <a:t> </a:t>
+            </a:r>
+            <a:r>
+              <a:rPr lang="en-CA" dirty="0" err="1">
+                <a:solidFill>
+                  <a:schemeClr val="bg1"/>
+                </a:solidFill>
+              </a:rPr>
+              <a:t>soit</a:t>
+            </a:r>
+            <a:r>
+              <a:rPr lang="en-CA" dirty="0">
+                <a:solidFill>
+                  <a:schemeClr val="bg1"/>
+                </a:solidFill>
+              </a:rPr>
+              <a:t> de type terrarium pour un reptile que </a:t>
+            </a:r>
+            <a:r>
+              <a:rPr lang="en-CA" dirty="0" err="1">
+                <a:solidFill>
+                  <a:schemeClr val="bg1"/>
+                </a:solidFill>
+              </a:rPr>
+              <a:t>serre</a:t>
+            </a:r>
+            <a:r>
+              <a:rPr lang="en-CA" dirty="0">
+                <a:solidFill>
+                  <a:schemeClr val="bg1"/>
+                </a:solidFill>
+              </a:rPr>
+              <a:t> pour </a:t>
+            </a:r>
+            <a:r>
+              <a:rPr lang="en-CA" dirty="0" err="1">
+                <a:solidFill>
+                  <a:schemeClr val="bg1"/>
+                </a:solidFill>
+              </a:rPr>
+              <a:t>une</a:t>
+            </a:r>
+            <a:r>
+              <a:rPr lang="en-CA" dirty="0">
+                <a:solidFill>
+                  <a:schemeClr val="bg1"/>
+                </a:solidFill>
+              </a:rPr>
+              <a:t> plante</a:t>
+            </a:r>
+            <a:endParaRPr lang="en-US" dirty="0">
               <a:solidFill>
                 <a:schemeClr val="bg1"/>
               </a:solidFill>

</xml_diff>